<commit_message>
Chỉnh sửa Slide, thêm clickNavbar vào AdminHeader
</commit_message>
<xml_diff>
--- a/Presentation_Group7.pptx
+++ b/Presentation_Group7.pptx
@@ -28084,19 +28084,97 @@
               <a:t> 7</a:t>
             </a:r>
             <a:br>
+              <a:rPr lang="en-US" sz="4000" dirty="0">
+                <a:latin typeface="Roboto Slab" pitchFamily="2" charset="0"/>
+                <a:ea typeface="Roboto Slab" pitchFamily="2" charset="0"/>
+              </a:rPr>
+            </a:br>
+            <a:r>
+              <a:rPr lang="en-US" sz="2200" b="0" dirty="0">
+                <a:latin typeface="Roboto Slab" pitchFamily="2" charset="0"/>
+                <a:ea typeface="Roboto Slab" pitchFamily="2" charset="0"/>
+              </a:rPr>
+              <a:t>GVHD: </a:t>
+            </a:r>
+            <a:r>
+              <a:rPr lang="en-US" sz="2200" b="0" dirty="0" err="1">
+                <a:latin typeface="Roboto Slab" pitchFamily="2" charset="0"/>
+                <a:ea typeface="Roboto Slab" pitchFamily="2" charset="0"/>
+              </a:rPr>
+              <a:t>Thầy</a:t>
+            </a:r>
+            <a:r>
+              <a:rPr lang="en-US" sz="2200" b="0" dirty="0">
+                <a:latin typeface="Roboto Slab" pitchFamily="2" charset="0"/>
+                <a:ea typeface="Roboto Slab" pitchFamily="2" charset="0"/>
+              </a:rPr>
+              <a:t> </a:t>
+            </a:r>
+            <a:r>
+              <a:rPr lang="en-US" sz="2200" b="0" dirty="0" err="1">
+                <a:latin typeface="Roboto Slab" pitchFamily="2" charset="0"/>
+                <a:ea typeface="Roboto Slab" pitchFamily="2" charset="0"/>
+              </a:rPr>
+              <a:t>Đào</a:t>
+            </a:r>
+            <a:r>
+              <a:rPr lang="en-US" sz="2200" b="0" dirty="0">
+                <a:latin typeface="Roboto Slab" pitchFamily="2" charset="0"/>
+                <a:ea typeface="Roboto Slab" pitchFamily="2" charset="0"/>
+              </a:rPr>
+              <a:t> </a:t>
+            </a:r>
+            <a:r>
+              <a:rPr lang="en-US" sz="2200" b="0" dirty="0" err="1">
+                <a:latin typeface="Roboto Slab" pitchFamily="2" charset="0"/>
+                <a:ea typeface="Roboto Slab" pitchFamily="2" charset="0"/>
+              </a:rPr>
+              <a:t>Trung</a:t>
+            </a:r>
+            <a:r>
+              <a:rPr lang="en-US" sz="2200" b="0" dirty="0">
+                <a:latin typeface="Roboto Slab" pitchFamily="2" charset="0"/>
+                <a:ea typeface="Roboto Slab" pitchFamily="2" charset="0"/>
+              </a:rPr>
+              <a:t> </a:t>
+            </a:r>
+            <a:r>
+              <a:rPr lang="en-US" sz="2200" b="0" dirty="0" err="1">
+                <a:latin typeface="Roboto Slab" pitchFamily="2" charset="0"/>
+                <a:ea typeface="Roboto Slab" pitchFamily="2" charset="0"/>
+              </a:rPr>
+              <a:t>Kiên</a:t>
+            </a:r>
+            <a:br>
+              <a:rPr lang="en-US" sz="2200" b="0" dirty="0">
+                <a:effectLst/>
+                <a:latin typeface="Roboto Slab" pitchFamily="2" charset="0"/>
+                <a:ea typeface="Roboto Slab" pitchFamily="2" charset="0"/>
+              </a:rPr>
+            </a:br>
+            <a:r>
               <a:rPr lang="en-US" sz="2000" b="0" dirty="0">
                 <a:effectLst/>
                 <a:latin typeface="Roboto Slab" pitchFamily="2" charset="0"/>
                 <a:ea typeface="Roboto Slab" pitchFamily="2" charset="0"/>
               </a:rPr>
-            </a:br>
+              <a:t>P</a:t>
+            </a:r>
+            <a:r>
+              <a:rPr lang="en-US" sz="2000" dirty="0">
+                <a:effectLst/>
+                <a:latin typeface="Roboto Slab" pitchFamily="2" charset="0"/>
+                <a:ea typeface="Roboto Slab" pitchFamily="2" charset="0"/>
+              </a:rPr>
+              <a:t>h</a:t>
+            </a:r>
             <a:r>
               <a:rPr lang="en-US" sz="2000" b="0" dirty="0">
                 <a:effectLst/>
                 <a:latin typeface="Roboto Slab" pitchFamily="2" charset="0"/>
                 <a:ea typeface="Roboto Slab" pitchFamily="2" charset="0"/>
               </a:rPr>
-              <a:t>Phan </a:t>
+              <a:t>an </a:t>
             </a:r>
             <a:r>
               <a:rPr lang="en-US" sz="2000" b="0" dirty="0" err="1">

</xml_diff>